<commit_message>
made map inset background white
</commit_message>
<xml_diff>
--- a/figures/Map.pptx
+++ b/figures/Map.pptx
@@ -7,6 +7,7 @@
   <p:sldIdLst>
     <p:sldId id="256" r:id="rId2"/>
     <p:sldId id="257" r:id="rId3"/>
+    <p:sldId id="258" r:id="rId4"/>
   </p:sldIdLst>
   <p:sldSz cx="12192000" cy="6858000"/>
   <p:notesSz cx="6858000" cy="9144000"/>
@@ -260,7 +261,7 @@
           <a:p>
             <a:fld id="{985D51E3-110F-C245-8664-52EE5301F690}" type="datetimeFigureOut">
               <a:rPr lang="en-US" smtClean="0"/>
-              <a:t>12/15/21</a:t>
+              <a:t>3/3/22</a:t>
             </a:fld>
             <a:endParaRPr lang="en-US"/>
           </a:p>
@@ -458,7 +459,7 @@
           <a:p>
             <a:fld id="{985D51E3-110F-C245-8664-52EE5301F690}" type="datetimeFigureOut">
               <a:rPr lang="en-US" smtClean="0"/>
-              <a:t>12/15/21</a:t>
+              <a:t>3/3/22</a:t>
             </a:fld>
             <a:endParaRPr lang="en-US"/>
           </a:p>
@@ -666,7 +667,7 @@
           <a:p>
             <a:fld id="{985D51E3-110F-C245-8664-52EE5301F690}" type="datetimeFigureOut">
               <a:rPr lang="en-US" smtClean="0"/>
-              <a:t>12/15/21</a:t>
+              <a:t>3/3/22</a:t>
             </a:fld>
             <a:endParaRPr lang="en-US"/>
           </a:p>
@@ -864,7 +865,7 @@
           <a:p>
             <a:fld id="{985D51E3-110F-C245-8664-52EE5301F690}" type="datetimeFigureOut">
               <a:rPr lang="en-US" smtClean="0"/>
-              <a:t>12/15/21</a:t>
+              <a:t>3/3/22</a:t>
             </a:fld>
             <a:endParaRPr lang="en-US"/>
           </a:p>
@@ -1139,7 +1140,7 @@
           <a:p>
             <a:fld id="{985D51E3-110F-C245-8664-52EE5301F690}" type="datetimeFigureOut">
               <a:rPr lang="en-US" smtClean="0"/>
-              <a:t>12/15/21</a:t>
+              <a:t>3/3/22</a:t>
             </a:fld>
             <a:endParaRPr lang="en-US"/>
           </a:p>
@@ -1404,7 +1405,7 @@
           <a:p>
             <a:fld id="{985D51E3-110F-C245-8664-52EE5301F690}" type="datetimeFigureOut">
               <a:rPr lang="en-US" smtClean="0"/>
-              <a:t>12/15/21</a:t>
+              <a:t>3/3/22</a:t>
             </a:fld>
             <a:endParaRPr lang="en-US"/>
           </a:p>
@@ -1816,7 +1817,7 @@
           <a:p>
             <a:fld id="{985D51E3-110F-C245-8664-52EE5301F690}" type="datetimeFigureOut">
               <a:rPr lang="en-US" smtClean="0"/>
-              <a:t>12/15/21</a:t>
+              <a:t>3/3/22</a:t>
             </a:fld>
             <a:endParaRPr lang="en-US"/>
           </a:p>
@@ -1957,7 +1958,7 @@
           <a:p>
             <a:fld id="{985D51E3-110F-C245-8664-52EE5301F690}" type="datetimeFigureOut">
               <a:rPr lang="en-US" smtClean="0"/>
-              <a:t>12/15/21</a:t>
+              <a:t>3/3/22</a:t>
             </a:fld>
             <a:endParaRPr lang="en-US"/>
           </a:p>
@@ -2070,7 +2071,7 @@
           <a:p>
             <a:fld id="{985D51E3-110F-C245-8664-52EE5301F690}" type="datetimeFigureOut">
               <a:rPr lang="en-US" smtClean="0"/>
-              <a:t>12/15/21</a:t>
+              <a:t>3/3/22</a:t>
             </a:fld>
             <a:endParaRPr lang="en-US"/>
           </a:p>
@@ -2381,7 +2382,7 @@
           <a:p>
             <a:fld id="{985D51E3-110F-C245-8664-52EE5301F690}" type="datetimeFigureOut">
               <a:rPr lang="en-US" smtClean="0"/>
-              <a:t>12/15/21</a:t>
+              <a:t>3/3/22</a:t>
             </a:fld>
             <a:endParaRPr lang="en-US"/>
           </a:p>
@@ -2669,7 +2670,7 @@
           <a:p>
             <a:fld id="{985D51E3-110F-C245-8664-52EE5301F690}" type="datetimeFigureOut">
               <a:rPr lang="en-US" smtClean="0"/>
-              <a:t>12/15/21</a:t>
+              <a:t>3/3/22</a:t>
             </a:fld>
             <a:endParaRPr lang="en-US"/>
           </a:p>
@@ -2910,7 +2911,7 @@
           <a:p>
             <a:fld id="{985D51E3-110F-C245-8664-52EE5301F690}" type="datetimeFigureOut">
               <a:rPr lang="en-US" smtClean="0"/>
-              <a:t>12/15/21</a:t>
+              <a:t>3/3/22</a:t>
             </a:fld>
             <a:endParaRPr lang="en-US"/>
           </a:p>
@@ -4015,6 +4016,610 @@
 </p:sld>
 </file>
 
+<file path=ppt/slides/slide3.xml><?xml version="1.0" encoding="utf-8"?>
+<p:sld xmlns:a="http://schemas.openxmlformats.org/drawingml/2006/main" xmlns:r="http://schemas.openxmlformats.org/officeDocument/2006/relationships" xmlns:p="http://schemas.openxmlformats.org/presentationml/2006/main">
+  <p:cSld>
+    <p:spTree>
+      <p:nvGrpSpPr>
+        <p:cNvPr id="1" name=""/>
+        <p:cNvGrpSpPr/>
+        <p:nvPr/>
+      </p:nvGrpSpPr>
+      <p:grpSpPr>
+        <a:xfrm>
+          <a:off x="0" y="0"/>
+          <a:ext cx="0" cy="0"/>
+          <a:chOff x="0" y="0"/>
+          <a:chExt cx="0" cy="0"/>
+        </a:xfrm>
+      </p:grpSpPr>
+      <p:sp>
+        <p:nvSpPr>
+          <p:cNvPr id="25" name="Rectangle 24">
+            <a:extLst>
+              <a:ext uri="{FF2B5EF4-FFF2-40B4-BE49-F238E27FC236}">
+                <a16:creationId xmlns:a16="http://schemas.microsoft.com/office/drawing/2014/main" id="{EF889FAF-52BD-DA4F-94E6-557E6C402004}"/>
+              </a:ext>
+            </a:extLst>
+          </p:cNvPr>
+          <p:cNvSpPr/>
+          <p:nvPr/>
+        </p:nvSpPr>
+        <p:spPr>
+          <a:xfrm>
+            <a:off x="3200758" y="1163055"/>
+            <a:ext cx="1393750" cy="1091230"/>
+          </a:xfrm>
+          <a:prstGeom prst="rect">
+            <a:avLst/>
+          </a:prstGeom>
+          <a:solidFill>
+            <a:schemeClr val="bg1"/>
+          </a:solidFill>
+          <a:ln>
+            <a:solidFill>
+              <a:schemeClr val="tx1"/>
+            </a:solidFill>
+          </a:ln>
+        </p:spPr>
+        <p:style>
+          <a:lnRef idx="2">
+            <a:schemeClr val="accent1">
+              <a:shade val="50000"/>
+            </a:schemeClr>
+          </a:lnRef>
+          <a:fillRef idx="1">
+            <a:schemeClr val="accent1"/>
+          </a:fillRef>
+          <a:effectRef idx="0">
+            <a:schemeClr val="accent1"/>
+          </a:effectRef>
+          <a:fontRef idx="minor">
+            <a:schemeClr val="lt1"/>
+          </a:fontRef>
+        </p:style>
+        <p:txBody>
+          <a:bodyPr rtlCol="0" anchor="ctr"/>
+          <a:lstStyle/>
+          <a:p>
+            <a:pPr algn="ctr"/>
+            <a:endParaRPr lang="en-US"/>
+          </a:p>
+        </p:txBody>
+      </p:sp>
+      <p:pic>
+        <p:nvPicPr>
+          <p:cNvPr id="23" name="Picture 22">
+            <a:extLst>
+              <a:ext uri="{FF2B5EF4-FFF2-40B4-BE49-F238E27FC236}">
+                <a16:creationId xmlns:a16="http://schemas.microsoft.com/office/drawing/2014/main" id="{807202C4-D3A7-BD4B-B766-FBBF9983A5F5}"/>
+              </a:ext>
+            </a:extLst>
+          </p:cNvPr>
+          <p:cNvPicPr>
+            <a:picLocks noChangeAspect="1"/>
+          </p:cNvPicPr>
+          <p:nvPr/>
+        </p:nvPicPr>
+        <p:blipFill rotWithShape="1">
+          <a:blip r:embed="rId2"/>
+          <a:srcRect l="28821" r="13060"/>
+          <a:stretch/>
+        </p:blipFill>
+        <p:spPr>
+          <a:xfrm>
+            <a:off x="4280452" y="0"/>
+            <a:ext cx="4982263" cy="6858000"/>
+          </a:xfrm>
+          <a:prstGeom prst="rect">
+            <a:avLst/>
+          </a:prstGeom>
+        </p:spPr>
+      </p:pic>
+      <p:sp>
+        <p:nvSpPr>
+          <p:cNvPr id="10" name="TextBox 9">
+            <a:extLst>
+              <a:ext uri="{FF2B5EF4-FFF2-40B4-BE49-F238E27FC236}">
+                <a16:creationId xmlns:a16="http://schemas.microsoft.com/office/drawing/2014/main" id="{93E48577-73D0-8C45-B66F-9F3EC8831C35}"/>
+              </a:ext>
+            </a:extLst>
+          </p:cNvPr>
+          <p:cNvSpPr txBox="1"/>
+          <p:nvPr/>
+        </p:nvSpPr>
+        <p:spPr>
+          <a:xfrm>
+            <a:off x="5901201" y="614853"/>
+            <a:ext cx="923651" cy="307777"/>
+          </a:xfrm>
+          <a:prstGeom prst="rect">
+            <a:avLst/>
+          </a:prstGeom>
+          <a:solidFill>
+            <a:schemeClr val="bg1"/>
+          </a:solidFill>
+        </p:spPr>
+        <p:txBody>
+          <a:bodyPr wrap="none" rtlCol="0">
+            <a:spAutoFit/>
+          </a:bodyPr>
+          <a:lstStyle/>
+          <a:p>
+            <a:r>
+              <a:rPr lang="en-US" sz="1400" dirty="0">
+                <a:latin typeface="Arial" panose="020B0604020202020204" pitchFamily="34" charset="0"/>
+                <a:cs typeface="Arial" panose="020B0604020202020204" pitchFamily="34" charset="0"/>
+              </a:rPr>
+              <a:t>121.5 °W</a:t>
+            </a:r>
+          </a:p>
+        </p:txBody>
+      </p:sp>
+      <p:sp>
+        <p:nvSpPr>
+          <p:cNvPr id="11" name="TextBox 10">
+            <a:extLst>
+              <a:ext uri="{FF2B5EF4-FFF2-40B4-BE49-F238E27FC236}">
+                <a16:creationId xmlns:a16="http://schemas.microsoft.com/office/drawing/2014/main" id="{AE02D616-A2F4-6B40-8458-193006CFF28F}"/>
+              </a:ext>
+            </a:extLst>
+          </p:cNvPr>
+          <p:cNvSpPr txBox="1"/>
+          <p:nvPr/>
+        </p:nvSpPr>
+        <p:spPr>
+          <a:xfrm>
+            <a:off x="7356884" y="1250728"/>
+            <a:ext cx="774571" cy="307777"/>
+          </a:xfrm>
+          <a:prstGeom prst="rect">
+            <a:avLst/>
+          </a:prstGeom>
+          <a:solidFill>
+            <a:schemeClr val="bg1"/>
+          </a:solidFill>
+        </p:spPr>
+        <p:txBody>
+          <a:bodyPr wrap="none" rtlCol="0">
+            <a:spAutoFit/>
+          </a:bodyPr>
+          <a:lstStyle/>
+          <a:p>
+            <a:r>
+              <a:rPr lang="en-US" sz="1400" dirty="0">
+                <a:latin typeface="Arial" panose="020B0604020202020204" pitchFamily="34" charset="0"/>
+                <a:cs typeface="Arial" panose="020B0604020202020204" pitchFamily="34" charset="0"/>
+              </a:rPr>
+              <a:t>121 °W</a:t>
+            </a:r>
+          </a:p>
+        </p:txBody>
+      </p:sp>
+      <p:sp>
+        <p:nvSpPr>
+          <p:cNvPr id="12" name="TextBox 11">
+            <a:extLst>
+              <a:ext uri="{FF2B5EF4-FFF2-40B4-BE49-F238E27FC236}">
+                <a16:creationId xmlns:a16="http://schemas.microsoft.com/office/drawing/2014/main" id="{F2419B81-4542-ED40-BFCD-06C730FDDBD2}"/>
+              </a:ext>
+            </a:extLst>
+          </p:cNvPr>
+          <p:cNvSpPr txBox="1"/>
+          <p:nvPr/>
+        </p:nvSpPr>
+        <p:spPr>
+          <a:xfrm>
+            <a:off x="8991243" y="1996963"/>
+            <a:ext cx="923651" cy="307777"/>
+          </a:xfrm>
+          <a:prstGeom prst="rect">
+            <a:avLst/>
+          </a:prstGeom>
+          <a:solidFill>
+            <a:schemeClr val="bg1"/>
+          </a:solidFill>
+        </p:spPr>
+        <p:txBody>
+          <a:bodyPr wrap="none" rtlCol="0">
+            <a:spAutoFit/>
+          </a:bodyPr>
+          <a:lstStyle/>
+          <a:p>
+            <a:r>
+              <a:rPr lang="en-US" sz="1400" dirty="0">
+                <a:latin typeface="Arial" panose="020B0604020202020204" pitchFamily="34" charset="0"/>
+                <a:cs typeface="Arial" panose="020B0604020202020204" pitchFamily="34" charset="0"/>
+              </a:rPr>
+              <a:t>120.5 °W</a:t>
+            </a:r>
+          </a:p>
+        </p:txBody>
+      </p:sp>
+      <p:sp>
+        <p:nvSpPr>
+          <p:cNvPr id="13" name="TextBox 12">
+            <a:extLst>
+              <a:ext uri="{FF2B5EF4-FFF2-40B4-BE49-F238E27FC236}">
+                <a16:creationId xmlns:a16="http://schemas.microsoft.com/office/drawing/2014/main" id="{73EF8462-7A05-B942-8A07-8874D463E533}"/>
+              </a:ext>
+            </a:extLst>
+          </p:cNvPr>
+          <p:cNvSpPr txBox="1"/>
+          <p:nvPr/>
+        </p:nvSpPr>
+        <p:spPr>
+          <a:xfrm>
+            <a:off x="9262714" y="4571299"/>
+            <a:ext cx="784189" cy="307777"/>
+          </a:xfrm>
+          <a:prstGeom prst="rect">
+            <a:avLst/>
+          </a:prstGeom>
+          <a:solidFill>
+            <a:schemeClr val="bg1"/>
+          </a:solidFill>
+        </p:spPr>
+        <p:txBody>
+          <a:bodyPr wrap="none" rtlCol="0">
+            <a:spAutoFit/>
+          </a:bodyPr>
+          <a:lstStyle/>
+          <a:p>
+            <a:r>
+              <a:rPr lang="en-US" sz="1400" dirty="0">
+                <a:latin typeface="Arial" panose="020B0604020202020204" pitchFamily="34" charset="0"/>
+                <a:cs typeface="Arial" panose="020B0604020202020204" pitchFamily="34" charset="0"/>
+              </a:rPr>
+              <a:t>48.6 °N</a:t>
+            </a:r>
+          </a:p>
+        </p:txBody>
+      </p:sp>
+      <p:sp>
+        <p:nvSpPr>
+          <p:cNvPr id="14" name="TextBox 13">
+            <a:extLst>
+              <a:ext uri="{FF2B5EF4-FFF2-40B4-BE49-F238E27FC236}">
+                <a16:creationId xmlns:a16="http://schemas.microsoft.com/office/drawing/2014/main" id="{E3567683-32A8-B34B-B55B-5CC1795FF245}"/>
+              </a:ext>
+            </a:extLst>
+          </p:cNvPr>
+          <p:cNvSpPr txBox="1"/>
+          <p:nvPr/>
+        </p:nvSpPr>
+        <p:spPr>
+          <a:xfrm>
+            <a:off x="9262713" y="5694507"/>
+            <a:ext cx="784189" cy="307777"/>
+          </a:xfrm>
+          <a:prstGeom prst="rect">
+            <a:avLst/>
+          </a:prstGeom>
+          <a:solidFill>
+            <a:schemeClr val="bg1"/>
+          </a:solidFill>
+        </p:spPr>
+        <p:txBody>
+          <a:bodyPr wrap="none" rtlCol="0">
+            <a:spAutoFit/>
+          </a:bodyPr>
+          <a:lstStyle/>
+          <a:p>
+            <a:r>
+              <a:rPr lang="en-US" sz="1400" dirty="0">
+                <a:latin typeface="Arial" panose="020B0604020202020204" pitchFamily="34" charset="0"/>
+                <a:cs typeface="Arial" panose="020B0604020202020204" pitchFamily="34" charset="0"/>
+              </a:rPr>
+              <a:t>48.4 °N</a:t>
+            </a:r>
+          </a:p>
+        </p:txBody>
+      </p:sp>
+      <p:sp>
+        <p:nvSpPr>
+          <p:cNvPr id="19" name="TextBox 18">
+            <a:extLst>
+              <a:ext uri="{FF2B5EF4-FFF2-40B4-BE49-F238E27FC236}">
+                <a16:creationId xmlns:a16="http://schemas.microsoft.com/office/drawing/2014/main" id="{5B503B93-2891-D048-AC26-37DE717CEA29}"/>
+              </a:ext>
+            </a:extLst>
+          </p:cNvPr>
+          <p:cNvSpPr txBox="1"/>
+          <p:nvPr/>
+        </p:nvSpPr>
+        <p:spPr>
+          <a:xfrm>
+            <a:off x="3215577" y="614853"/>
+            <a:ext cx="356188" cy="400110"/>
+          </a:xfrm>
+          <a:prstGeom prst="rect">
+            <a:avLst/>
+          </a:prstGeom>
+          <a:noFill/>
+        </p:spPr>
+        <p:txBody>
+          <a:bodyPr wrap="none" rtlCol="0">
+            <a:spAutoFit/>
+          </a:bodyPr>
+          <a:lstStyle/>
+          <a:p>
+            <a:r>
+              <a:rPr lang="en-US" sz="2000" dirty="0">
+                <a:latin typeface="Arial" panose="020B0604020202020204" pitchFamily="34" charset="0"/>
+                <a:cs typeface="Arial" panose="020B0604020202020204" pitchFamily="34" charset="0"/>
+              </a:rPr>
+              <a:t>A</a:t>
+            </a:r>
+          </a:p>
+        </p:txBody>
+      </p:sp>
+      <p:sp>
+        <p:nvSpPr>
+          <p:cNvPr id="24" name="TextBox 23">
+            <a:extLst>
+              <a:ext uri="{FF2B5EF4-FFF2-40B4-BE49-F238E27FC236}">
+                <a16:creationId xmlns:a16="http://schemas.microsoft.com/office/drawing/2014/main" id="{20BE50A5-9965-FC47-932E-FAF103E2B197}"/>
+              </a:ext>
+            </a:extLst>
+          </p:cNvPr>
+          <p:cNvSpPr txBox="1"/>
+          <p:nvPr/>
+        </p:nvSpPr>
+        <p:spPr>
+          <a:xfrm>
+            <a:off x="9262715" y="3417439"/>
+            <a:ext cx="784189" cy="307777"/>
+          </a:xfrm>
+          <a:prstGeom prst="rect">
+            <a:avLst/>
+          </a:prstGeom>
+          <a:solidFill>
+            <a:schemeClr val="bg1"/>
+          </a:solidFill>
+        </p:spPr>
+        <p:txBody>
+          <a:bodyPr wrap="none" rtlCol="0">
+            <a:spAutoFit/>
+          </a:bodyPr>
+          <a:lstStyle/>
+          <a:p>
+            <a:r>
+              <a:rPr lang="en-US" sz="1400" dirty="0">
+                <a:latin typeface="Arial" panose="020B0604020202020204" pitchFamily="34" charset="0"/>
+                <a:cs typeface="Arial" panose="020B0604020202020204" pitchFamily="34" charset="0"/>
+              </a:rPr>
+              <a:t>48.8 °N</a:t>
+            </a:r>
+          </a:p>
+        </p:txBody>
+      </p:sp>
+      <p:pic>
+        <p:nvPicPr>
+          <p:cNvPr id="15" name="Picture 14">
+            <a:extLst>
+              <a:ext uri="{FF2B5EF4-FFF2-40B4-BE49-F238E27FC236}">
+                <a16:creationId xmlns:a16="http://schemas.microsoft.com/office/drawing/2014/main" id="{05B7F9BE-9AE2-C74C-8E30-96279E1918E6}"/>
+              </a:ext>
+            </a:extLst>
+          </p:cNvPr>
+          <p:cNvPicPr>
+            <a:picLocks noChangeAspect="1"/>
+          </p:cNvPicPr>
+          <p:nvPr/>
+        </p:nvPicPr>
+        <p:blipFill rotWithShape="1">
+          <a:blip r:embed="rId3"/>
+          <a:srcRect l="9074" t="14335" r="89744" b="79115"/>
+          <a:stretch/>
+        </p:blipFill>
+        <p:spPr>
+          <a:xfrm>
+            <a:off x="3287287" y="1250727"/>
+            <a:ext cx="208976" cy="927291"/>
+          </a:xfrm>
+          <a:prstGeom prst="rect">
+            <a:avLst/>
+          </a:prstGeom>
+          <a:ln>
+            <a:noFill/>
+          </a:ln>
+        </p:spPr>
+      </p:pic>
+      <p:sp>
+        <p:nvSpPr>
+          <p:cNvPr id="16" name="TextBox 15">
+            <a:extLst>
+              <a:ext uri="{FF2B5EF4-FFF2-40B4-BE49-F238E27FC236}">
+                <a16:creationId xmlns:a16="http://schemas.microsoft.com/office/drawing/2014/main" id="{AE20E72B-4024-E34F-9D3F-E0D3A22E925C}"/>
+              </a:ext>
+            </a:extLst>
+          </p:cNvPr>
+          <p:cNvSpPr txBox="1"/>
+          <p:nvPr/>
+        </p:nvSpPr>
+        <p:spPr>
+          <a:xfrm>
+            <a:off x="3510557" y="1555911"/>
+            <a:ext cx="1083951" cy="338554"/>
+          </a:xfrm>
+          <a:prstGeom prst="rect">
+            <a:avLst/>
+          </a:prstGeom>
+          <a:noFill/>
+        </p:spPr>
+        <p:txBody>
+          <a:bodyPr wrap="none" rtlCol="0">
+            <a:spAutoFit/>
+          </a:bodyPr>
+          <a:lstStyle/>
+          <a:p>
+            <a:r>
+              <a:rPr lang="en-US" sz="1600" dirty="0">
+                <a:latin typeface="Arial" panose="020B0604020202020204" pitchFamily="34" charset="0"/>
+                <a:cs typeface="Arial" panose="020B0604020202020204" pitchFamily="34" charset="0"/>
+              </a:rPr>
+              <a:t>Unburned</a:t>
+            </a:r>
+          </a:p>
+        </p:txBody>
+      </p:sp>
+      <p:sp>
+        <p:nvSpPr>
+          <p:cNvPr id="17" name="TextBox 16">
+            <a:extLst>
+              <a:ext uri="{FF2B5EF4-FFF2-40B4-BE49-F238E27FC236}">
+                <a16:creationId xmlns:a16="http://schemas.microsoft.com/office/drawing/2014/main" id="{8F29629C-728B-854B-AD9D-5D7D7D66B167}"/>
+              </a:ext>
+            </a:extLst>
+          </p:cNvPr>
+          <p:cNvSpPr txBox="1"/>
+          <p:nvPr/>
+        </p:nvSpPr>
+        <p:spPr>
+          <a:xfrm>
+            <a:off x="3515206" y="1200839"/>
+            <a:ext cx="845103" cy="338554"/>
+          </a:xfrm>
+          <a:prstGeom prst="rect">
+            <a:avLst/>
+          </a:prstGeom>
+          <a:noFill/>
+        </p:spPr>
+        <p:txBody>
+          <a:bodyPr wrap="none" rtlCol="0">
+            <a:spAutoFit/>
+          </a:bodyPr>
+          <a:lstStyle/>
+          <a:p>
+            <a:r>
+              <a:rPr lang="en-US" sz="1600" dirty="0">
+                <a:latin typeface="Arial" panose="020B0604020202020204" pitchFamily="34" charset="0"/>
+                <a:cs typeface="Arial" panose="020B0604020202020204" pitchFamily="34" charset="0"/>
+              </a:rPr>
+              <a:t>Burned</a:t>
+            </a:r>
+          </a:p>
+        </p:txBody>
+      </p:sp>
+      <p:sp>
+        <p:nvSpPr>
+          <p:cNvPr id="18" name="TextBox 17">
+            <a:extLst>
+              <a:ext uri="{FF2B5EF4-FFF2-40B4-BE49-F238E27FC236}">
+                <a16:creationId xmlns:a16="http://schemas.microsoft.com/office/drawing/2014/main" id="{A337BEE3-CA6E-9A49-A938-AB54A7F85B24}"/>
+              </a:ext>
+            </a:extLst>
+          </p:cNvPr>
+          <p:cNvSpPr txBox="1"/>
+          <p:nvPr/>
+        </p:nvSpPr>
+        <p:spPr>
+          <a:xfrm>
+            <a:off x="3515206" y="1915731"/>
+            <a:ext cx="537327" cy="338554"/>
+          </a:xfrm>
+          <a:prstGeom prst="rect">
+            <a:avLst/>
+          </a:prstGeom>
+          <a:noFill/>
+        </p:spPr>
+        <p:txBody>
+          <a:bodyPr wrap="none" rtlCol="0">
+            <a:spAutoFit/>
+          </a:bodyPr>
+          <a:lstStyle/>
+          <a:p>
+            <a:r>
+              <a:rPr lang="en-US" sz="1600" dirty="0">
+                <a:latin typeface="Arial" panose="020B0604020202020204" pitchFamily="34" charset="0"/>
+                <a:cs typeface="Arial" panose="020B0604020202020204" pitchFamily="34" charset="0"/>
+              </a:rPr>
+              <a:t>Fire</a:t>
+            </a:r>
+          </a:p>
+        </p:txBody>
+      </p:sp>
+      <p:pic>
+        <p:nvPicPr>
+          <p:cNvPr id="4" name="Picture 3">
+            <a:extLst>
+              <a:ext uri="{FF2B5EF4-FFF2-40B4-BE49-F238E27FC236}">
+                <a16:creationId xmlns:a16="http://schemas.microsoft.com/office/drawing/2014/main" id="{CF5A9089-FEE9-3148-BE73-B536683D66DE}"/>
+              </a:ext>
+            </a:extLst>
+          </p:cNvPr>
+          <p:cNvPicPr>
+            <a:picLocks noChangeAspect="1"/>
+          </p:cNvPicPr>
+          <p:nvPr/>
+        </p:nvPicPr>
+        <p:blipFill rotWithShape="1">
+          <a:blip r:embed="rId4"/>
+          <a:srcRect l="24942" t="5757" r="16692" b="6227"/>
+          <a:stretch/>
+        </p:blipFill>
+        <p:spPr>
+          <a:xfrm>
+            <a:off x="3197387" y="3810176"/>
+            <a:ext cx="2325844" cy="2192108"/>
+          </a:xfrm>
+          <a:prstGeom prst="rect">
+            <a:avLst/>
+          </a:prstGeom>
+        </p:spPr>
+      </p:pic>
+      <p:sp>
+        <p:nvSpPr>
+          <p:cNvPr id="9" name="TextBox 8">
+            <a:extLst>
+              <a:ext uri="{FF2B5EF4-FFF2-40B4-BE49-F238E27FC236}">
+                <a16:creationId xmlns:a16="http://schemas.microsoft.com/office/drawing/2014/main" id="{4D6FCE9A-F01D-E747-9E62-9C05C9DDF4F1}"/>
+              </a:ext>
+            </a:extLst>
+          </p:cNvPr>
+          <p:cNvSpPr txBox="1"/>
+          <p:nvPr/>
+        </p:nvSpPr>
+        <p:spPr>
+          <a:xfrm>
+            <a:off x="3213681" y="3769886"/>
+            <a:ext cx="356188" cy="400110"/>
+          </a:xfrm>
+          <a:prstGeom prst="rect">
+            <a:avLst/>
+          </a:prstGeom>
+          <a:noFill/>
+        </p:spPr>
+        <p:txBody>
+          <a:bodyPr wrap="none" rtlCol="0">
+            <a:spAutoFit/>
+          </a:bodyPr>
+          <a:lstStyle/>
+          <a:p>
+            <a:r>
+              <a:rPr lang="en-US" sz="2000" dirty="0">
+                <a:latin typeface="Arial" panose="020B0604020202020204" pitchFamily="34" charset="0"/>
+                <a:cs typeface="Arial" panose="020B0604020202020204" pitchFamily="34" charset="0"/>
+              </a:rPr>
+              <a:t>B</a:t>
+            </a:r>
+          </a:p>
+        </p:txBody>
+      </p:sp>
+    </p:spTree>
+    <p:extLst>
+      <p:ext uri="{BB962C8B-B14F-4D97-AF65-F5344CB8AC3E}">
+        <p14:creationId xmlns:p14="http://schemas.microsoft.com/office/powerpoint/2010/main" val="3967345057"/>
+      </p:ext>
+    </p:extLst>
+  </p:cSld>
+  <p:clrMapOvr>
+    <a:masterClrMapping/>
+  </p:clrMapOvr>
+</p:sld>
+</file>
+
 <file path=ppt/theme/theme1.xml><?xml version="1.0" encoding="utf-8"?>
 <a:theme xmlns:a="http://schemas.openxmlformats.org/drawingml/2006/main" name="Office Theme">
   <a:themeElements>

</xml_diff>

<commit_message>
Updated map to include compass, scale bar, and border
</commit_message>
<xml_diff>
--- a/figures/Map.pptx
+++ b/figures/Map.pptx
@@ -261,7 +261,7 @@
           <a:p>
             <a:fld id="{985D51E3-110F-C245-8664-52EE5301F690}" type="datetimeFigureOut">
               <a:rPr lang="en-US" smtClean="0"/>
-              <a:t>3/3/22</a:t>
+              <a:t>8/30/22</a:t>
             </a:fld>
             <a:endParaRPr lang="en-US"/>
           </a:p>
@@ -459,7 +459,7 @@
           <a:p>
             <a:fld id="{985D51E3-110F-C245-8664-52EE5301F690}" type="datetimeFigureOut">
               <a:rPr lang="en-US" smtClean="0"/>
-              <a:t>3/3/22</a:t>
+              <a:t>8/30/22</a:t>
             </a:fld>
             <a:endParaRPr lang="en-US"/>
           </a:p>
@@ -667,7 +667,7 @@
           <a:p>
             <a:fld id="{985D51E3-110F-C245-8664-52EE5301F690}" type="datetimeFigureOut">
               <a:rPr lang="en-US" smtClean="0"/>
-              <a:t>3/3/22</a:t>
+              <a:t>8/30/22</a:t>
             </a:fld>
             <a:endParaRPr lang="en-US"/>
           </a:p>
@@ -865,7 +865,7 @@
           <a:p>
             <a:fld id="{985D51E3-110F-C245-8664-52EE5301F690}" type="datetimeFigureOut">
               <a:rPr lang="en-US" smtClean="0"/>
-              <a:t>3/3/22</a:t>
+              <a:t>8/30/22</a:t>
             </a:fld>
             <a:endParaRPr lang="en-US"/>
           </a:p>
@@ -1140,7 +1140,7 @@
           <a:p>
             <a:fld id="{985D51E3-110F-C245-8664-52EE5301F690}" type="datetimeFigureOut">
               <a:rPr lang="en-US" smtClean="0"/>
-              <a:t>3/3/22</a:t>
+              <a:t>8/30/22</a:t>
             </a:fld>
             <a:endParaRPr lang="en-US"/>
           </a:p>
@@ -1405,7 +1405,7 @@
           <a:p>
             <a:fld id="{985D51E3-110F-C245-8664-52EE5301F690}" type="datetimeFigureOut">
               <a:rPr lang="en-US" smtClean="0"/>
-              <a:t>3/3/22</a:t>
+              <a:t>8/30/22</a:t>
             </a:fld>
             <a:endParaRPr lang="en-US"/>
           </a:p>
@@ -1817,7 +1817,7 @@
           <a:p>
             <a:fld id="{985D51E3-110F-C245-8664-52EE5301F690}" type="datetimeFigureOut">
               <a:rPr lang="en-US" smtClean="0"/>
-              <a:t>3/3/22</a:t>
+              <a:t>8/30/22</a:t>
             </a:fld>
             <a:endParaRPr lang="en-US"/>
           </a:p>
@@ -1958,7 +1958,7 @@
           <a:p>
             <a:fld id="{985D51E3-110F-C245-8664-52EE5301F690}" type="datetimeFigureOut">
               <a:rPr lang="en-US" smtClean="0"/>
-              <a:t>3/3/22</a:t>
+              <a:t>8/30/22</a:t>
             </a:fld>
             <a:endParaRPr lang="en-US"/>
           </a:p>
@@ -2071,7 +2071,7 @@
           <a:p>
             <a:fld id="{985D51E3-110F-C245-8664-52EE5301F690}" type="datetimeFigureOut">
               <a:rPr lang="en-US" smtClean="0"/>
-              <a:t>3/3/22</a:t>
+              <a:t>8/30/22</a:t>
             </a:fld>
             <a:endParaRPr lang="en-US"/>
           </a:p>
@@ -2382,7 +2382,7 @@
           <a:p>
             <a:fld id="{985D51E3-110F-C245-8664-52EE5301F690}" type="datetimeFigureOut">
               <a:rPr lang="en-US" smtClean="0"/>
-              <a:t>3/3/22</a:t>
+              <a:t>8/30/22</a:t>
             </a:fld>
             <a:endParaRPr lang="en-US"/>
           </a:p>
@@ -2670,7 +2670,7 @@
           <a:p>
             <a:fld id="{985D51E3-110F-C245-8664-52EE5301F690}" type="datetimeFigureOut">
               <a:rPr lang="en-US" smtClean="0"/>
-              <a:t>3/3/22</a:t>
+              <a:t>8/30/22</a:t>
             </a:fld>
             <a:endParaRPr lang="en-US"/>
           </a:p>
@@ -2911,7 +2911,7 @@
           <a:p>
             <a:fld id="{985D51E3-110F-C245-8664-52EE5301F690}" type="datetimeFigureOut">
               <a:rPr lang="en-US" smtClean="0"/>
-              <a:t>3/3/22</a:t>
+              <a:t>8/30/22</a:t>
             </a:fld>
             <a:endParaRPr lang="en-US"/>
           </a:p>
@@ -4035,10 +4035,10 @@
       </p:grpSpPr>
       <p:sp>
         <p:nvSpPr>
-          <p:cNvPr id="25" name="Rectangle 24">
-            <a:extLst>
-              <a:ext uri="{FF2B5EF4-FFF2-40B4-BE49-F238E27FC236}">
-                <a16:creationId xmlns:a16="http://schemas.microsoft.com/office/drawing/2014/main" id="{EF889FAF-52BD-DA4F-94E6-557E6C402004}"/>
+          <p:cNvPr id="26" name="Rectangle 25">
+            <a:extLst>
+              <a:ext uri="{FF2B5EF4-FFF2-40B4-BE49-F238E27FC236}">
+                <a16:creationId xmlns:a16="http://schemas.microsoft.com/office/drawing/2014/main" id="{BC58C679-4E17-3064-C718-B897FA208427}"/>
               </a:ext>
             </a:extLst>
           </p:cNvPr>
@@ -4047,8 +4047,8 @@
         </p:nvSpPr>
         <p:spPr>
           <a:xfrm>
-            <a:off x="3200758" y="1163055"/>
-            <a:ext cx="1393750" cy="1091230"/>
+            <a:off x="3048000" y="528320"/>
+            <a:ext cx="7081519" cy="5567679"/>
           </a:xfrm>
           <a:prstGeom prst="rect">
             <a:avLst/>
@@ -4056,7 +4056,7 @@
           <a:solidFill>
             <a:schemeClr val="bg1"/>
           </a:solidFill>
-          <a:ln>
+          <a:ln w="3175">
             <a:solidFill>
               <a:schemeClr val="tx1"/>
             </a:solidFill>
@@ -4083,7 +4083,7 @@
           <a:lstStyle/>
           <a:p>
             <a:pPr algn="ctr"/>
-            <a:endParaRPr lang="en-US"/>
+            <a:endParaRPr lang="en-CA"/>
           </a:p>
         </p:txBody>
       </p:sp>
@@ -4103,13 +4103,13 @@
         </p:nvPicPr>
         <p:blipFill rotWithShape="1">
           <a:blip r:embed="rId2"/>
-          <a:srcRect l="28821" r="13060"/>
+          <a:srcRect l="28821" t="8965" r="13060" b="9850"/>
           <a:stretch/>
         </p:blipFill>
         <p:spPr>
           <a:xfrm>
-            <a:off x="4280452" y="0"/>
-            <a:ext cx="4982263" cy="6858000"/>
+            <a:off x="4280452" y="614852"/>
+            <a:ext cx="4982263" cy="5567679"/>
           </a:xfrm>
           <a:prstGeom prst="rect">
             <a:avLst/>
@@ -4396,10 +4396,10 @@
       </p:sp>
       <p:pic>
         <p:nvPicPr>
-          <p:cNvPr id="15" name="Picture 14">
-            <a:extLst>
-              <a:ext uri="{FF2B5EF4-FFF2-40B4-BE49-F238E27FC236}">
-                <a16:creationId xmlns:a16="http://schemas.microsoft.com/office/drawing/2014/main" id="{05B7F9BE-9AE2-C74C-8E30-96279E1918E6}"/>
+          <p:cNvPr id="4" name="Picture 3">
+            <a:extLst>
+              <a:ext uri="{FF2B5EF4-FFF2-40B4-BE49-F238E27FC236}">
+                <a16:creationId xmlns:a16="http://schemas.microsoft.com/office/drawing/2014/main" id="{CF5A9089-FEE9-3148-BE73-B536683D66DE}"/>
               </a:ext>
             </a:extLst>
           </p:cNvPr>
@@ -4410,28 +4410,25 @@
         </p:nvPicPr>
         <p:blipFill rotWithShape="1">
           <a:blip r:embed="rId3"/>
-          <a:srcRect l="9074" t="14335" r="89744" b="79115"/>
+          <a:srcRect l="25713" t="5757" r="16692" b="7345"/>
           <a:stretch/>
         </p:blipFill>
         <p:spPr>
           <a:xfrm>
-            <a:off x="3287287" y="1250727"/>
-            <a:ext cx="208976" cy="927291"/>
+            <a:off x="3214595" y="3828104"/>
+            <a:ext cx="2295123" cy="2164260"/>
           </a:xfrm>
           <a:prstGeom prst="rect">
             <a:avLst/>
           </a:prstGeom>
-          <a:ln>
-            <a:noFill/>
-          </a:ln>
         </p:spPr>
       </p:pic>
       <p:sp>
         <p:nvSpPr>
-          <p:cNvPr id="16" name="TextBox 15">
-            <a:extLst>
-              <a:ext uri="{FF2B5EF4-FFF2-40B4-BE49-F238E27FC236}">
-                <a16:creationId xmlns:a16="http://schemas.microsoft.com/office/drawing/2014/main" id="{AE20E72B-4024-E34F-9D3F-E0D3A22E925C}"/>
+          <p:cNvPr id="9" name="TextBox 8">
+            <a:extLst>
+              <a:ext uri="{FF2B5EF4-FFF2-40B4-BE49-F238E27FC236}">
+                <a16:creationId xmlns:a16="http://schemas.microsoft.com/office/drawing/2014/main" id="{4D6FCE9A-F01D-E747-9E62-9C05C9DDF4F1}"/>
               </a:ext>
             </a:extLst>
           </p:cNvPr>
@@ -4440,8 +4437,8 @@
         </p:nvSpPr>
         <p:spPr>
           <a:xfrm>
-            <a:off x="3510557" y="1555911"/>
-            <a:ext cx="1083951" cy="338554"/>
+            <a:off x="3213681" y="3769886"/>
+            <a:ext cx="356188" cy="400110"/>
           </a:xfrm>
           <a:prstGeom prst="rect">
             <a:avLst/>
@@ -4455,21 +4452,21 @@
           <a:lstStyle/>
           <a:p>
             <a:r>
-              <a:rPr lang="en-US" sz="1600" dirty="0">
+              <a:rPr lang="en-US" sz="2000" dirty="0">
                 <a:latin typeface="Arial" panose="020B0604020202020204" pitchFamily="34" charset="0"/>
                 <a:cs typeface="Arial" panose="020B0604020202020204" pitchFamily="34" charset="0"/>
               </a:rPr>
-              <a:t>Unburned</a:t>
-            </a:r>
-          </a:p>
-        </p:txBody>
-      </p:sp>
-      <p:sp>
-        <p:nvSpPr>
-          <p:cNvPr id="17" name="TextBox 16">
-            <a:extLst>
-              <a:ext uri="{FF2B5EF4-FFF2-40B4-BE49-F238E27FC236}">
-                <a16:creationId xmlns:a16="http://schemas.microsoft.com/office/drawing/2014/main" id="{8F29629C-728B-854B-AD9D-5D7D7D66B167}"/>
+              <a:t>B</a:t>
+            </a:r>
+          </a:p>
+        </p:txBody>
+      </p:sp>
+      <p:sp>
+        <p:nvSpPr>
+          <p:cNvPr id="2" name="TextBox 1">
+            <a:extLst>
+              <a:ext uri="{FF2B5EF4-FFF2-40B4-BE49-F238E27FC236}">
+                <a16:creationId xmlns:a16="http://schemas.microsoft.com/office/drawing/2014/main" id="{E775495A-F1EF-DA56-5A94-B876417155ED}"/>
               </a:ext>
             </a:extLst>
           </p:cNvPr>
@@ -4477,9 +4474,9 @@
           <p:nvPr/>
         </p:nvSpPr>
         <p:spPr>
-          <a:xfrm>
-            <a:off x="3515206" y="1200839"/>
-            <a:ext cx="845103" cy="338554"/>
+          <a:xfrm rot="1330753">
+            <a:off x="3672170" y="2673292"/>
+            <a:ext cx="351378" cy="369332"/>
           </a:xfrm>
           <a:prstGeom prst="rect">
             <a:avLst/>
@@ -4493,21 +4490,116 @@
           <a:lstStyle/>
           <a:p>
             <a:r>
-              <a:rPr lang="en-US" sz="1600" dirty="0">
+              <a:rPr lang="en-CA" b="1" dirty="0">
                 <a:latin typeface="Arial" panose="020B0604020202020204" pitchFamily="34" charset="0"/>
                 <a:cs typeface="Arial" panose="020B0604020202020204" pitchFamily="34" charset="0"/>
               </a:rPr>
-              <a:t>Burned</a:t>
-            </a:r>
-          </a:p>
-        </p:txBody>
-      </p:sp>
-      <p:sp>
-        <p:nvSpPr>
-          <p:cNvPr id="18" name="TextBox 17">
-            <a:extLst>
-              <a:ext uri="{FF2B5EF4-FFF2-40B4-BE49-F238E27FC236}">
-                <a16:creationId xmlns:a16="http://schemas.microsoft.com/office/drawing/2014/main" id="{A337BEE3-CA6E-9A49-A938-AB54A7F85B24}"/>
+              <a:t>N</a:t>
+            </a:r>
+          </a:p>
+        </p:txBody>
+      </p:sp>
+      <p:sp>
+        <p:nvSpPr>
+          <p:cNvPr id="3" name="Chevron 2">
+            <a:extLst>
+              <a:ext uri="{FF2B5EF4-FFF2-40B4-BE49-F238E27FC236}">
+                <a16:creationId xmlns:a16="http://schemas.microsoft.com/office/drawing/2014/main" id="{98FB0B2E-596F-35D7-9117-384C72E790CC}"/>
+              </a:ext>
+            </a:extLst>
+          </p:cNvPr>
+          <p:cNvSpPr/>
+          <p:nvPr/>
+        </p:nvSpPr>
+        <p:spPr>
+          <a:xfrm rot="17517641">
+            <a:off x="3574355" y="2977833"/>
+            <a:ext cx="298876" cy="332556"/>
+          </a:xfrm>
+          <a:prstGeom prst="chevron">
+            <a:avLst/>
+          </a:prstGeom>
+          <a:solidFill>
+            <a:schemeClr val="tx1"/>
+          </a:solidFill>
+          <a:ln>
+            <a:noFill/>
+          </a:ln>
+        </p:spPr>
+        <p:style>
+          <a:lnRef idx="2">
+            <a:schemeClr val="accent1">
+              <a:shade val="50000"/>
+            </a:schemeClr>
+          </a:lnRef>
+          <a:fillRef idx="1">
+            <a:schemeClr val="accent1"/>
+          </a:fillRef>
+          <a:effectRef idx="0">
+            <a:schemeClr val="accent1"/>
+          </a:effectRef>
+          <a:fontRef idx="minor">
+            <a:schemeClr val="lt1"/>
+          </a:fontRef>
+        </p:style>
+        <p:txBody>
+          <a:bodyPr rtlCol="0" anchor="ctr"/>
+          <a:lstStyle/>
+          <a:p>
+            <a:pPr algn="ctr"/>
+            <a:endParaRPr lang="en-CA">
+              <a:solidFill>
+                <a:schemeClr val="tx1"/>
+              </a:solidFill>
+            </a:endParaRPr>
+          </a:p>
+        </p:txBody>
+      </p:sp>
+      <p:cxnSp>
+        <p:nvCxnSpPr>
+          <p:cNvPr id="6" name="Straight Connector 5">
+            <a:extLst>
+              <a:ext uri="{FF2B5EF4-FFF2-40B4-BE49-F238E27FC236}">
+                <a16:creationId xmlns:a16="http://schemas.microsoft.com/office/drawing/2014/main" id="{4A4C4E0E-EAA6-7CCE-162A-321999FAEAFA}"/>
+              </a:ext>
+            </a:extLst>
+          </p:cNvPr>
+          <p:cNvCxnSpPr>
+            <a:cxnSpLocks/>
+          </p:cNvCxnSpPr>
+          <p:nvPr/>
+        </p:nvCxnSpPr>
+        <p:spPr>
+          <a:xfrm>
+            <a:off x="8052432" y="5796859"/>
+            <a:ext cx="418454" cy="0"/>
+          </a:xfrm>
+          <a:prstGeom prst="line">
+            <a:avLst/>
+          </a:prstGeom>
+          <a:ln w="19050"/>
+        </p:spPr>
+        <p:style>
+          <a:lnRef idx="1">
+            <a:schemeClr val="dk1"/>
+          </a:lnRef>
+          <a:fillRef idx="0">
+            <a:schemeClr val="dk1"/>
+          </a:fillRef>
+          <a:effectRef idx="0">
+            <a:schemeClr val="dk1"/>
+          </a:effectRef>
+          <a:fontRef idx="minor">
+            <a:schemeClr val="tx1"/>
+          </a:fontRef>
+        </p:style>
+      </p:cxnSp>
+      <p:sp>
+        <p:nvSpPr>
+          <p:cNvPr id="7" name="TextBox 6">
+            <a:extLst>
+              <a:ext uri="{FF2B5EF4-FFF2-40B4-BE49-F238E27FC236}">
+                <a16:creationId xmlns:a16="http://schemas.microsoft.com/office/drawing/2014/main" id="{77EE9A23-96D4-C126-AF5B-0D12033991D2}"/>
               </a:ext>
             </a:extLst>
           </p:cNvPr>
@@ -4516,8 +4608,8 @@
         </p:nvSpPr>
         <p:spPr>
           <a:xfrm>
-            <a:off x="3515206" y="1915731"/>
-            <a:ext cx="537327" cy="338554"/>
+            <a:off x="7940863" y="5612193"/>
+            <a:ext cx="223138" cy="184666"/>
           </a:xfrm>
           <a:prstGeom prst="rect">
             <a:avLst/>
@@ -4531,21 +4623,179 @@
           <a:lstStyle/>
           <a:p>
             <a:r>
-              <a:rPr lang="en-US" sz="1600" dirty="0">
-                <a:latin typeface="Arial" panose="020B0604020202020204" pitchFamily="34" charset="0"/>
-                <a:cs typeface="Arial" panose="020B0604020202020204" pitchFamily="34" charset="0"/>
-              </a:rPr>
-              <a:t>Fire</a:t>
-            </a:r>
+              <a:rPr lang="en-CA" sz="600" dirty="0"/>
+              <a:t>0</a:t>
+            </a:r>
+          </a:p>
+        </p:txBody>
+      </p:sp>
+      <p:cxnSp>
+        <p:nvCxnSpPr>
+          <p:cNvPr id="20" name="Straight Connector 19">
+            <a:extLst>
+              <a:ext uri="{FF2B5EF4-FFF2-40B4-BE49-F238E27FC236}">
+                <a16:creationId xmlns:a16="http://schemas.microsoft.com/office/drawing/2014/main" id="{A7F74270-D959-2BBE-5578-934792A0106F}"/>
+              </a:ext>
+            </a:extLst>
+          </p:cNvPr>
+          <p:cNvCxnSpPr/>
+          <p:nvPr/>
+        </p:nvCxnSpPr>
+        <p:spPr>
+          <a:xfrm>
+            <a:off x="8470886" y="5752699"/>
+            <a:ext cx="0" cy="92488"/>
+          </a:xfrm>
+          <a:prstGeom prst="line">
+            <a:avLst/>
+          </a:prstGeom>
+        </p:spPr>
+        <p:style>
+          <a:lnRef idx="1">
+            <a:schemeClr val="dk1"/>
+          </a:lnRef>
+          <a:fillRef idx="0">
+            <a:schemeClr val="dk1"/>
+          </a:fillRef>
+          <a:effectRef idx="0">
+            <a:schemeClr val="dk1"/>
+          </a:effectRef>
+          <a:fontRef idx="minor">
+            <a:schemeClr val="tx1"/>
+          </a:fontRef>
+        </p:style>
+      </p:cxnSp>
+      <p:cxnSp>
+        <p:nvCxnSpPr>
+          <p:cNvPr id="21" name="Straight Connector 20">
+            <a:extLst>
+              <a:ext uri="{FF2B5EF4-FFF2-40B4-BE49-F238E27FC236}">
+                <a16:creationId xmlns:a16="http://schemas.microsoft.com/office/drawing/2014/main" id="{4FCE06E2-B606-5744-8E88-877B2A45C844}"/>
+              </a:ext>
+            </a:extLst>
+          </p:cNvPr>
+          <p:cNvCxnSpPr/>
+          <p:nvPr/>
+        </p:nvCxnSpPr>
+        <p:spPr>
+          <a:xfrm>
+            <a:off x="8052432" y="5747128"/>
+            <a:ext cx="0" cy="92488"/>
+          </a:xfrm>
+          <a:prstGeom prst="line">
+            <a:avLst/>
+          </a:prstGeom>
+        </p:spPr>
+        <p:style>
+          <a:lnRef idx="1">
+            <a:schemeClr val="dk1"/>
+          </a:lnRef>
+          <a:fillRef idx="0">
+            <a:schemeClr val="dk1"/>
+          </a:fillRef>
+          <a:effectRef idx="0">
+            <a:schemeClr val="dk1"/>
+          </a:effectRef>
+          <a:fontRef idx="minor">
+            <a:schemeClr val="tx1"/>
+          </a:fontRef>
+        </p:style>
+      </p:cxnSp>
+      <p:sp>
+        <p:nvSpPr>
+          <p:cNvPr id="22" name="TextBox 21">
+            <a:extLst>
+              <a:ext uri="{FF2B5EF4-FFF2-40B4-BE49-F238E27FC236}">
+                <a16:creationId xmlns:a16="http://schemas.microsoft.com/office/drawing/2014/main" id="{5C66C1D6-0DD9-AD33-A74A-790542EA8406}"/>
+              </a:ext>
+            </a:extLst>
+          </p:cNvPr>
+          <p:cNvSpPr txBox="1"/>
+          <p:nvPr/>
+        </p:nvSpPr>
+        <p:spPr>
+          <a:xfrm>
+            <a:off x="8337933" y="5614086"/>
+            <a:ext cx="375424" cy="184666"/>
+          </a:xfrm>
+          <a:prstGeom prst="rect">
+            <a:avLst/>
+          </a:prstGeom>
+          <a:noFill/>
+        </p:spPr>
+        <p:txBody>
+          <a:bodyPr wrap="none" rtlCol="0">
+            <a:spAutoFit/>
+          </a:bodyPr>
+          <a:lstStyle/>
+          <a:p>
+            <a:r>
+              <a:rPr lang="en-CA" sz="600" dirty="0"/>
+              <a:t>10 km</a:t>
+            </a:r>
+          </a:p>
+        </p:txBody>
+      </p:sp>
+      <p:sp>
+        <p:nvSpPr>
+          <p:cNvPr id="25" name="Rectangle 24">
+            <a:extLst>
+              <a:ext uri="{FF2B5EF4-FFF2-40B4-BE49-F238E27FC236}">
+                <a16:creationId xmlns:a16="http://schemas.microsoft.com/office/drawing/2014/main" id="{EF889FAF-52BD-DA4F-94E6-557E6C402004}"/>
+              </a:ext>
+            </a:extLst>
+          </p:cNvPr>
+          <p:cNvSpPr/>
+          <p:nvPr/>
+        </p:nvSpPr>
+        <p:spPr>
+          <a:xfrm>
+            <a:off x="3200758" y="1163055"/>
+            <a:ext cx="1393750" cy="1091230"/>
+          </a:xfrm>
+          <a:prstGeom prst="rect">
+            <a:avLst/>
+          </a:prstGeom>
+          <a:solidFill>
+            <a:schemeClr val="bg1"/>
+          </a:solidFill>
+          <a:ln>
+            <a:solidFill>
+              <a:schemeClr val="tx1"/>
+            </a:solidFill>
+          </a:ln>
+        </p:spPr>
+        <p:style>
+          <a:lnRef idx="2">
+            <a:schemeClr val="accent1">
+              <a:shade val="50000"/>
+            </a:schemeClr>
+          </a:lnRef>
+          <a:fillRef idx="1">
+            <a:schemeClr val="accent1"/>
+          </a:fillRef>
+          <a:effectRef idx="0">
+            <a:schemeClr val="accent1"/>
+          </a:effectRef>
+          <a:fontRef idx="minor">
+            <a:schemeClr val="lt1"/>
+          </a:fontRef>
+        </p:style>
+        <p:txBody>
+          <a:bodyPr rtlCol="0" anchor="ctr"/>
+          <a:lstStyle/>
+          <a:p>
+            <a:pPr algn="ctr"/>
+            <a:endParaRPr lang="en-US"/>
           </a:p>
         </p:txBody>
       </p:sp>
       <p:pic>
         <p:nvPicPr>
-          <p:cNvPr id="4" name="Picture 3">
-            <a:extLst>
-              <a:ext uri="{FF2B5EF4-FFF2-40B4-BE49-F238E27FC236}">
-                <a16:creationId xmlns:a16="http://schemas.microsoft.com/office/drawing/2014/main" id="{CF5A9089-FEE9-3148-BE73-B536683D66DE}"/>
+          <p:cNvPr id="15" name="Picture 14">
+            <a:extLst>
+              <a:ext uri="{FF2B5EF4-FFF2-40B4-BE49-F238E27FC236}">
+                <a16:creationId xmlns:a16="http://schemas.microsoft.com/office/drawing/2014/main" id="{05B7F9BE-9AE2-C74C-8E30-96279E1918E6}"/>
               </a:ext>
             </a:extLst>
           </p:cNvPr>
@@ -4556,25 +4806,28 @@
         </p:nvPicPr>
         <p:blipFill rotWithShape="1">
           <a:blip r:embed="rId4"/>
-          <a:srcRect l="24942" t="5757" r="16692" b="6227"/>
+          <a:srcRect l="9074" t="14335" r="89744" b="79115"/>
           <a:stretch/>
         </p:blipFill>
         <p:spPr>
           <a:xfrm>
-            <a:off x="3197387" y="3810176"/>
-            <a:ext cx="2325844" cy="2192108"/>
+            <a:off x="3287287" y="1250727"/>
+            <a:ext cx="208976" cy="927291"/>
           </a:xfrm>
           <a:prstGeom prst="rect">
             <a:avLst/>
           </a:prstGeom>
+          <a:ln>
+            <a:noFill/>
+          </a:ln>
         </p:spPr>
       </p:pic>
       <p:sp>
         <p:nvSpPr>
-          <p:cNvPr id="9" name="TextBox 8">
-            <a:extLst>
-              <a:ext uri="{FF2B5EF4-FFF2-40B4-BE49-F238E27FC236}">
-                <a16:creationId xmlns:a16="http://schemas.microsoft.com/office/drawing/2014/main" id="{4D6FCE9A-F01D-E747-9E62-9C05C9DDF4F1}"/>
+          <p:cNvPr id="16" name="TextBox 15">
+            <a:extLst>
+              <a:ext uri="{FF2B5EF4-FFF2-40B4-BE49-F238E27FC236}">
+                <a16:creationId xmlns:a16="http://schemas.microsoft.com/office/drawing/2014/main" id="{AE20E72B-4024-E34F-9D3F-E0D3A22E925C}"/>
               </a:ext>
             </a:extLst>
           </p:cNvPr>
@@ -4583,8 +4836,8 @@
         </p:nvSpPr>
         <p:spPr>
           <a:xfrm>
-            <a:off x="3213681" y="3769886"/>
-            <a:ext cx="356188" cy="400110"/>
+            <a:off x="3510557" y="1555911"/>
+            <a:ext cx="1083951" cy="338554"/>
           </a:xfrm>
           <a:prstGeom prst="rect">
             <a:avLst/>
@@ -4598,11 +4851,87 @@
           <a:lstStyle/>
           <a:p>
             <a:r>
-              <a:rPr lang="en-US" sz="2000" dirty="0">
+              <a:rPr lang="en-US" sz="1600" dirty="0">
                 <a:latin typeface="Arial" panose="020B0604020202020204" pitchFamily="34" charset="0"/>
                 <a:cs typeface="Arial" panose="020B0604020202020204" pitchFamily="34" charset="0"/>
               </a:rPr>
-              <a:t>B</a:t>
+              <a:t>Unburned</a:t>
+            </a:r>
+          </a:p>
+        </p:txBody>
+      </p:sp>
+      <p:sp>
+        <p:nvSpPr>
+          <p:cNvPr id="17" name="TextBox 16">
+            <a:extLst>
+              <a:ext uri="{FF2B5EF4-FFF2-40B4-BE49-F238E27FC236}">
+                <a16:creationId xmlns:a16="http://schemas.microsoft.com/office/drawing/2014/main" id="{8F29629C-728B-854B-AD9D-5D7D7D66B167}"/>
+              </a:ext>
+            </a:extLst>
+          </p:cNvPr>
+          <p:cNvSpPr txBox="1"/>
+          <p:nvPr/>
+        </p:nvSpPr>
+        <p:spPr>
+          <a:xfrm>
+            <a:off x="3515206" y="1200839"/>
+            <a:ext cx="845103" cy="338554"/>
+          </a:xfrm>
+          <a:prstGeom prst="rect">
+            <a:avLst/>
+          </a:prstGeom>
+          <a:noFill/>
+        </p:spPr>
+        <p:txBody>
+          <a:bodyPr wrap="none" rtlCol="0">
+            <a:spAutoFit/>
+          </a:bodyPr>
+          <a:lstStyle/>
+          <a:p>
+            <a:r>
+              <a:rPr lang="en-US" sz="1600" dirty="0">
+                <a:latin typeface="Arial" panose="020B0604020202020204" pitchFamily="34" charset="0"/>
+                <a:cs typeface="Arial" panose="020B0604020202020204" pitchFamily="34" charset="0"/>
+              </a:rPr>
+              <a:t>Burned</a:t>
+            </a:r>
+          </a:p>
+        </p:txBody>
+      </p:sp>
+      <p:sp>
+        <p:nvSpPr>
+          <p:cNvPr id="18" name="TextBox 17">
+            <a:extLst>
+              <a:ext uri="{FF2B5EF4-FFF2-40B4-BE49-F238E27FC236}">
+                <a16:creationId xmlns:a16="http://schemas.microsoft.com/office/drawing/2014/main" id="{A337BEE3-CA6E-9A49-A938-AB54A7F85B24}"/>
+              </a:ext>
+            </a:extLst>
+          </p:cNvPr>
+          <p:cNvSpPr txBox="1"/>
+          <p:nvPr/>
+        </p:nvSpPr>
+        <p:spPr>
+          <a:xfrm>
+            <a:off x="3515206" y="1915731"/>
+            <a:ext cx="537327" cy="338554"/>
+          </a:xfrm>
+          <a:prstGeom prst="rect">
+            <a:avLst/>
+          </a:prstGeom>
+          <a:noFill/>
+        </p:spPr>
+        <p:txBody>
+          <a:bodyPr wrap="none" rtlCol="0">
+            <a:spAutoFit/>
+          </a:bodyPr>
+          <a:lstStyle/>
+          <a:p>
+            <a:r>
+              <a:rPr lang="en-US" sz="1600" dirty="0">
+                <a:latin typeface="Arial" panose="020B0604020202020204" pitchFamily="34" charset="0"/>
+                <a:cs typeface="Arial" panose="020B0604020202020204" pitchFamily="34" charset="0"/>
+              </a:rPr>
+              <a:t>Fire</a:t>
             </a:r>
           </a:p>
         </p:txBody>

</xml_diff>